<commit_message>
iptw tutorials draft up
</commit_message>
<xml_diff>
--- a/consultation/materials/2020_12_08_iptw_msm.pptx
+++ b/consultation/materials/2020_12_08_iptw_msm.pptx
@@ -355,7 +355,7 @@
             <a:fld id="{87DE6118-2437-4B30-8E3C-4D2BE6020583}" type="datetimeFigureOut">
               <a:rPr lang="en-US" dirty="0"/>
               <a:pPr/>
-              <a:t>12/7/2020</a:t>
+              <a:t>12/10/2020</a:t>
             </a:fld>
             <a:endParaRPr lang="en-US" dirty="0"/>
           </a:p>
@@ -681,7 +681,7 @@
           <a:p>
             <a:fld id="{87DE6118-2437-4B30-8E3C-4D2BE6020583}" type="datetimeFigureOut">
               <a:rPr lang="en-US" dirty="0"/>
-              <a:t>12/7/2020</a:t>
+              <a:t>12/10/2020</a:t>
             </a:fld>
             <a:endParaRPr lang="en-US" dirty="0"/>
           </a:p>
@@ -856,7 +856,7 @@
           <a:p>
             <a:fld id="{87DE6118-2437-4B30-8E3C-4D2BE6020583}" type="datetimeFigureOut">
               <a:rPr lang="en-US" dirty="0"/>
-              <a:t>12/7/2020</a:t>
+              <a:t>12/10/2020</a:t>
             </a:fld>
             <a:endParaRPr lang="en-US" dirty="0"/>
           </a:p>
@@ -1021,7 +1021,7 @@
           <a:p>
             <a:fld id="{87DE6118-2437-4B30-8E3C-4D2BE6020583}" type="datetimeFigureOut">
               <a:rPr lang="en-US" dirty="0"/>
-              <a:t>12/7/2020</a:t>
+              <a:t>12/10/2020</a:t>
             </a:fld>
             <a:endParaRPr lang="en-US" dirty="0"/>
           </a:p>
@@ -1294,7 +1294,7 @@
             <a:fld id="{87DE6118-2437-4B30-8E3C-4D2BE6020583}" type="datetimeFigureOut">
               <a:rPr lang="en-US" dirty="0"/>
               <a:pPr/>
-              <a:t>12/7/2020</a:t>
+              <a:t>12/10/2020</a:t>
             </a:fld>
             <a:endParaRPr lang="en-US" dirty="0"/>
           </a:p>
@@ -1684,7 +1684,7 @@
           <a:p>
             <a:fld id="{87DE6118-2437-4B30-8E3C-4D2BE6020583}" type="datetimeFigureOut">
               <a:rPr lang="en-US" dirty="0"/>
-              <a:t>12/7/2020</a:t>
+              <a:t>12/10/2020</a:t>
             </a:fld>
             <a:endParaRPr lang="en-US" dirty="0"/>
           </a:p>
@@ -2156,7 +2156,7 @@
           <a:p>
             <a:fld id="{87DE6118-2437-4B30-8E3C-4D2BE6020583}" type="datetimeFigureOut">
               <a:rPr lang="en-US" dirty="0"/>
-              <a:t>12/7/2020</a:t>
+              <a:t>12/10/2020</a:t>
             </a:fld>
             <a:endParaRPr lang="en-US" dirty="0"/>
           </a:p>
@@ -2269,7 +2269,7 @@
           <a:p>
             <a:fld id="{87DE6118-2437-4B30-8E3C-4D2BE6020583}" type="datetimeFigureOut">
               <a:rPr lang="en-US" dirty="0"/>
-              <a:t>12/7/2020</a:t>
+              <a:t>12/10/2020</a:t>
             </a:fld>
             <a:endParaRPr lang="en-US" dirty="0"/>
           </a:p>
@@ -2359,7 +2359,7 @@
           <a:p>
             <a:fld id="{87DE6118-2437-4B30-8E3C-4D2BE6020583}" type="datetimeFigureOut">
               <a:rPr lang="en-US" dirty="0"/>
-              <a:t>12/7/2020</a:t>
+              <a:t>12/10/2020</a:t>
             </a:fld>
             <a:endParaRPr lang="en-US" dirty="0"/>
           </a:p>
@@ -2701,7 +2701,7 @@
             <a:fld id="{87DE6118-2437-4B30-8E3C-4D2BE6020583}" type="datetimeFigureOut">
               <a:rPr lang="en-US" dirty="0"/>
               <a:pPr/>
-              <a:t>12/7/2020</a:t>
+              <a:t>12/10/2020</a:t>
             </a:fld>
             <a:endParaRPr lang="en-US" dirty="0"/>
           </a:p>
@@ -3086,7 +3086,7 @@
             <a:fld id="{87DE6118-2437-4B30-8E3C-4D2BE6020583}" type="datetimeFigureOut">
               <a:rPr lang="en-US" dirty="0"/>
               <a:pPr/>
-              <a:t>12/7/2020</a:t>
+              <a:t>12/10/2020</a:t>
             </a:fld>
             <a:endParaRPr lang="en-US" dirty="0"/>
           </a:p>
@@ -3361,7 +3361,7 @@
             <a:fld id="{87DE6118-2437-4B30-8E3C-4D2BE6020583}" type="datetimeFigureOut">
               <a:rPr lang="en-US" dirty="0"/>
               <a:pPr/>
-              <a:t>12/7/2020</a:t>
+              <a:t>12/10/2020</a:t>
             </a:fld>
             <a:endParaRPr lang="en-US" dirty="0"/>
           </a:p>
@@ -22371,10 +22371,10 @@
       </p:sp>
       <p:pic>
         <p:nvPicPr>
-          <p:cNvPr id="4" name="Picture 3">
+          <p:cNvPr id="6" name="Picture 5">
             <a:extLst>
               <a:ext uri="{FF2B5EF4-FFF2-40B4-BE49-F238E27FC236}">
-                <a16:creationId xmlns:a16="http://schemas.microsoft.com/office/drawing/2014/main" id="{1D6FB162-78F3-403F-8D95-35F6DFB0167F}"/>
+                <a16:creationId xmlns:a16="http://schemas.microsoft.com/office/drawing/2014/main" id="{99F844E8-070D-4FC0-A827-59F425F9CB05}"/>
               </a:ext>
             </a:extLst>
           </p:cNvPr>
@@ -22391,8 +22391,8 @@
         </p:blipFill>
         <p:spPr>
           <a:xfrm>
-            <a:off x="6310045" y="0"/>
-            <a:ext cx="5881955" cy="6858000"/>
+            <a:off x="5876925" y="0"/>
+            <a:ext cx="6315075" cy="6858000"/>
           </a:xfrm>
           <a:prstGeom prst="rect">
             <a:avLst/>
@@ -23593,12 +23593,21 @@
 </file>
 
 <file path=customXml/item1.xml><?xml version="1.0" encoding="utf-8"?>
+<?mso-contentType ?>
+<FormTemplates xmlns="http://schemas.microsoft.com/sharepoint/v3/contenttype/forms">
+  <Display>DocumentLibraryForm</Display>
+  <Edit>DocumentLibraryForm</Edit>
+  <New>DocumentLibraryForm</New>
+</FormTemplates>
+</file>
+
+<file path=customXml/item2.xml><?xml version="1.0" encoding="utf-8"?>
 <p:properties xmlns:p="http://schemas.microsoft.com/office/2006/metadata/properties" xmlns:xsi="http://www.w3.org/2001/XMLSchema-instance" xmlns:pc="http://schemas.microsoft.com/office/infopath/2007/PartnerControls">
   <documentManagement/>
 </p:properties>
 </file>
 
-<file path=customXml/item2.xml><?xml version="1.0" encoding="utf-8"?>
+<file path=customXml/item3.xml><?xml version="1.0" encoding="utf-8"?>
 <ct:contentTypeSchema xmlns:ct="http://schemas.microsoft.com/office/2006/metadata/contentType" xmlns:ma="http://schemas.microsoft.com/office/2006/metadata/properties/metaAttributes" ct:_="" ma:_="" ma:contentTypeName="Document" ma:contentTypeID="0x0101008B08C67D19E496499D068DD73FB28CA8" ma:contentTypeVersion="2" ma:contentTypeDescription="Create a new document." ma:contentTypeScope="" ma:versionID="185fd0a5e46e25a547cf6c8d2140cbb3">
   <xsd:schema xmlns:xsd="http://www.w3.org/2001/XMLSchema" xmlns:xs="http://www.w3.org/2001/XMLSchema" xmlns:p="http://schemas.microsoft.com/office/2006/metadata/properties" xmlns:ns3="ab281ab5-f419-4215-b698-b416d8849b0d" targetNamespace="http://schemas.microsoft.com/office/2006/metadata/properties" ma:root="true" ma:fieldsID="cee11b5984d7549ae459b2d532c33fa8" ns3:_="">
     <xsd:import namespace="ab281ab5-f419-4215-b698-b416d8849b0d"/>
@@ -23730,16 +23739,15 @@
 </ct:contentTypeSchema>
 </file>
 
-<file path=customXml/item3.xml><?xml version="1.0" encoding="utf-8"?>
-<?mso-contentType ?>
-<FormTemplates xmlns="http://schemas.microsoft.com/sharepoint/v3/contenttype/forms">
-  <Display>DocumentLibraryForm</Display>
-  <Edit>DocumentLibraryForm</Edit>
-  <New>DocumentLibraryForm</New>
-</FormTemplates>
+<file path=customXml/itemProps1.xml><?xml version="1.0" encoding="utf-8"?>
+<ds:datastoreItem xmlns:ds="http://schemas.openxmlformats.org/officeDocument/2006/customXml" ds:itemID="{3E76274F-B73C-4844-BD84-B4FE694ADEB6}">
+  <ds:schemaRefs>
+    <ds:schemaRef ds:uri="http://schemas.microsoft.com/sharepoint/v3/contenttype/forms"/>
+  </ds:schemaRefs>
+</ds:datastoreItem>
 </file>
 
-<file path=customXml/itemProps1.xml><?xml version="1.0" encoding="utf-8"?>
+<file path=customXml/itemProps2.xml><?xml version="1.0" encoding="utf-8"?>
 <ds:datastoreItem xmlns:ds="http://schemas.openxmlformats.org/officeDocument/2006/customXml" ds:itemID="{0E91A09C-E109-45A0-B06D-CF4838B6E785}">
   <ds:schemaRefs>
     <ds:schemaRef ds:uri="http://schemas.microsoft.com/office/infopath/2007/PartnerControls"/>
@@ -23755,7 +23763,7 @@
 </ds:datastoreItem>
 </file>
 
-<file path=customXml/itemProps2.xml><?xml version="1.0" encoding="utf-8"?>
+<file path=customXml/itemProps3.xml><?xml version="1.0" encoding="utf-8"?>
 <ds:datastoreItem xmlns:ds="http://schemas.openxmlformats.org/officeDocument/2006/customXml" ds:itemID="{A24F16DF-7855-449E-8AEC-CFDE6DB3FE49}">
   <ds:schemaRefs>
     <ds:schemaRef ds:uri="http://schemas.microsoft.com/office/2006/metadata/contentType"/>
@@ -23771,12 +23779,4 @@
     <ds:schemaRef ds:uri="http://schemas.microsoft.com/internal/obd"/>
   </ds:schemaRefs>
 </ds:datastoreItem>
-</file>
-
-<file path=customXml/itemProps3.xml><?xml version="1.0" encoding="utf-8"?>
-<ds:datastoreItem xmlns:ds="http://schemas.openxmlformats.org/officeDocument/2006/customXml" ds:itemID="{3E76274F-B73C-4844-BD84-B4FE694ADEB6}">
-  <ds:schemaRefs>
-    <ds:schemaRef ds:uri="http://schemas.microsoft.com/sharepoint/v3/contenttype/forms"/>
-  </ds:schemaRefs>
-</ds:datastoreItem>
 </file>
</xml_diff>